<commit_message>
Updated the presentation and exploring various colormaps.
</commit_message>
<xml_diff>
--- a/reports/20201103_shumko_sampex_microburst_durations.pptx
+++ b/reports/20201103_shumko_sampex_microburst_durations.pptx
@@ -16,9 +16,9 @@
     <p:sldId id="261" r:id="rId7"/>
     <p:sldId id="263" r:id="rId8"/>
     <p:sldId id="262" r:id="rId9"/>
-    <p:sldId id="264" r:id="rId10"/>
-    <p:sldId id="265" r:id="rId11"/>
-    <p:sldId id="266" r:id="rId12"/>
+    <p:sldId id="265" r:id="rId10"/>
+    <p:sldId id="269" r:id="rId11"/>
+    <p:sldId id="264" r:id="rId12"/>
     <p:sldId id="267" r:id="rId13"/>
     <p:sldId id="268" r:id="rId14"/>
   </p:sldIdLst>
@@ -3995,47 +3995,25 @@
             <p:ph type="title"/>
           </p:nvPr>
         </p:nvSpPr>
-        <p:spPr/>
-        <p:txBody>
-          <a:bodyPr/>
-          <a:lstStyle/>
-          <a:p>
-            <a:r>
-              <a:rPr lang="en-US" dirty="0"/>
-              <a:t>The chorus rising tone element duration follows a similar pattern.</a:t>
-            </a:r>
-          </a:p>
-        </p:txBody>
-      </p:sp>
-      <p:pic>
-        <p:nvPicPr>
-          <p:cNvPr id="8" name="Content Placeholder 7">
-            <a:extLst>
-              <a:ext uri="{FF2B5EF4-FFF2-40B4-BE49-F238E27FC236}">
-                <a16:creationId xmlns:a16="http://schemas.microsoft.com/office/drawing/2014/main" id="{B2C8391E-2896-7747-81BA-B69D606F3F39}"/>
-              </a:ext>
-            </a:extLst>
-          </p:cNvPr>
-          <p:cNvPicPr>
-            <a:picLocks noGrp="1" noChangeAspect="1"/>
-          </p:cNvPicPr>
-          <p:nvPr>
-            <p:ph idx="1"/>
-          </p:nvPr>
-        </p:nvPicPr>
-        <p:blipFill>
-          <a:blip r:embed="rId2"/>
-          <a:stretch>
-            <a:fillRect/>
-          </a:stretch>
-        </p:blipFill>
         <p:spPr>
           <a:xfrm>
-            <a:off x="1346139" y="1690688"/>
-            <a:ext cx="6432524" cy="4750677"/>
+            <a:off x="264649" y="1187776"/>
+            <a:ext cx="3280346" cy="4482448"/>
           </a:xfrm>
         </p:spPr>
-      </p:pic>
+        <p:txBody>
+          <a:bodyPr>
+            <a:normAutofit/>
+          </a:bodyPr>
+          <a:lstStyle/>
+          <a:p>
+            <a:r>
+              <a:rPr lang="en-US" dirty="0"/>
+              <a:t>How to the chorus and microburst duration distributions compare?</a:t>
+            </a:r>
+          </a:p>
+        </p:txBody>
+      </p:sp>
       <p:sp>
         <p:nvSpPr>
           <p:cNvPr id="4" name="Date Placeholder 3">
@@ -4136,13 +4114,13 @@
           <p:nvPr/>
         </p:nvPicPr>
         <p:blipFill rotWithShape="1">
-          <a:blip r:embed="rId3"/>
+          <a:blip r:embed="rId2"/>
           <a:srcRect r="50662"/>
           <a:stretch/>
         </p:blipFill>
         <p:spPr>
           <a:xfrm>
-            <a:off x="8510205" y="1577671"/>
+            <a:off x="4070846" y="1017451"/>
             <a:ext cx="2943989" cy="4778679"/>
           </a:xfrm>
           <a:prstGeom prst="rect">
@@ -4164,7 +4142,7 @@
         </p:nvSpPr>
         <p:spPr>
           <a:xfrm>
-            <a:off x="9682619" y="2329841"/>
+            <a:off x="5243260" y="1769621"/>
             <a:ext cx="1553228" cy="369332"/>
           </a:xfrm>
           <a:prstGeom prst="rect">
@@ -4199,7 +4177,7 @@
         </p:nvSpPr>
         <p:spPr>
           <a:xfrm>
-            <a:off x="9659411" y="4389975"/>
+            <a:off x="5220052" y="3829755"/>
             <a:ext cx="1553228" cy="369332"/>
           </a:xfrm>
           <a:prstGeom prst="rect">
@@ -4234,7 +4212,7 @@
         </p:nvSpPr>
         <p:spPr>
           <a:xfrm>
-            <a:off x="6379493" y="5891574"/>
+            <a:off x="4763636" y="5889889"/>
             <a:ext cx="1755975" cy="369332"/>
           </a:xfrm>
           <a:prstGeom prst="rect">
@@ -4255,62 +4233,112 @@
           </a:p>
         </p:txBody>
       </p:sp>
-      <p:sp>
-        <p:nvSpPr>
-          <p:cNvPr id="14" name="Rectangle 13">
-            <a:extLst>
-              <a:ext uri="{FF2B5EF4-FFF2-40B4-BE49-F238E27FC236}">
-                <a16:creationId xmlns:a16="http://schemas.microsoft.com/office/drawing/2014/main" id="{6E660982-C307-2040-8FCF-A7FC3B45FCA0}"/>
-              </a:ext>
-            </a:extLst>
-          </p:cNvPr>
-          <p:cNvSpPr/>
+      <p:pic>
+        <p:nvPicPr>
+          <p:cNvPr id="16" name="Picture 15">
+            <a:extLst>
+              <a:ext uri="{FF2B5EF4-FFF2-40B4-BE49-F238E27FC236}">
+                <a16:creationId xmlns:a16="http://schemas.microsoft.com/office/drawing/2014/main" id="{4E995CBE-C125-B74C-8E7B-4AB43AFD0E99}"/>
+              </a:ext>
+            </a:extLst>
+          </p:cNvPr>
+          <p:cNvPicPr>
+            <a:picLocks noChangeAspect="1"/>
+          </p:cNvPicPr>
           <p:nvPr/>
-        </p:nvSpPr>
+        </p:nvPicPr>
+        <p:blipFill>
+          <a:blip r:embed="rId3"/>
+          <a:stretch>
+            <a:fillRect/>
+          </a:stretch>
+        </p:blipFill>
         <p:spPr>
           <a:xfrm>
-            <a:off x="8304756" y="1577671"/>
-            <a:ext cx="3331923" cy="4778679"/>
+            <a:off x="7540686" y="1017451"/>
+            <a:ext cx="3185786" cy="4778679"/>
+          </a:xfrm>
+          <a:prstGeom prst="rect">
+            <a:avLst/>
+          </a:prstGeom>
+        </p:spPr>
+      </p:pic>
+      <p:sp>
+        <p:nvSpPr>
+          <p:cNvPr id="17" name="TextBox 16">
+            <a:extLst>
+              <a:ext uri="{FF2B5EF4-FFF2-40B4-BE49-F238E27FC236}">
+                <a16:creationId xmlns:a16="http://schemas.microsoft.com/office/drawing/2014/main" id="{DD3BB641-7B9E-D344-897A-F6864B69EC5A}"/>
+              </a:ext>
+            </a:extLst>
+          </p:cNvPr>
+          <p:cNvSpPr txBox="1"/>
+          <p:nvPr/>
+        </p:nvSpPr>
+        <p:spPr>
+          <a:xfrm>
+            <a:off x="5037130" y="444552"/>
+            <a:ext cx="1208985" cy="523220"/>
           </a:xfrm>
           <a:prstGeom prst="rect">
             <a:avLst/>
           </a:prstGeom>
           <a:noFill/>
-          <a:ln w="38100">
-            <a:solidFill>
-              <a:srgbClr val="FF0000"/>
-            </a:solidFill>
-          </a:ln>
         </p:spPr>
-        <p:style>
-          <a:lnRef idx="2">
-            <a:schemeClr val="accent1">
-              <a:shade val="50000"/>
-            </a:schemeClr>
-          </a:lnRef>
-          <a:fillRef idx="1">
-            <a:schemeClr val="accent1"/>
-          </a:fillRef>
-          <a:effectRef idx="0">
-            <a:schemeClr val="accent1"/>
-          </a:effectRef>
-          <a:fontRef idx="minor">
-            <a:schemeClr val="lt1"/>
-          </a:fontRef>
-        </p:style>
-        <p:txBody>
-          <a:bodyPr rtlCol="0" anchor="ctr"/>
-          <a:lstStyle/>
-          <a:p>
-            <a:pPr algn="ctr"/>
-            <a:endParaRPr lang="en-US"/>
+        <p:txBody>
+          <a:bodyPr wrap="none" rtlCol="0">
+            <a:spAutoFit/>
+          </a:bodyPr>
+          <a:lstStyle/>
+          <a:p>
+            <a:r>
+              <a:rPr lang="en-US" sz="2800" dirty="0"/>
+              <a:t>Chorus</a:t>
+            </a:r>
+            <a:endParaRPr lang="en-US" dirty="0"/>
+          </a:p>
+        </p:txBody>
+      </p:sp>
+      <p:sp>
+        <p:nvSpPr>
+          <p:cNvPr id="18" name="TextBox 17">
+            <a:extLst>
+              <a:ext uri="{FF2B5EF4-FFF2-40B4-BE49-F238E27FC236}">
+                <a16:creationId xmlns:a16="http://schemas.microsoft.com/office/drawing/2014/main" id="{9B813EDE-1ED3-B748-B84F-AA352623312E}"/>
+              </a:ext>
+            </a:extLst>
+          </p:cNvPr>
+          <p:cNvSpPr txBox="1"/>
+          <p:nvPr/>
+        </p:nvSpPr>
+        <p:spPr>
+          <a:xfrm>
+            <a:off x="8168379" y="475731"/>
+            <a:ext cx="1930400" cy="523220"/>
+          </a:xfrm>
+          <a:prstGeom prst="rect">
+            <a:avLst/>
+          </a:prstGeom>
+          <a:noFill/>
+        </p:spPr>
+        <p:txBody>
+          <a:bodyPr wrap="none" rtlCol="0">
+            <a:spAutoFit/>
+          </a:bodyPr>
+          <a:lstStyle/>
+          <a:p>
+            <a:r>
+              <a:rPr lang="en-US" sz="2800" dirty="0"/>
+              <a:t>Microbursts</a:t>
+            </a:r>
+            <a:endParaRPr lang="en-US" dirty="0"/>
           </a:p>
         </p:txBody>
       </p:sp>
     </p:spTree>
     <p:extLst>
       <p:ext uri="{BB962C8B-B14F-4D97-AF65-F5344CB8AC3E}">
-        <p14:creationId xmlns:p14="http://schemas.microsoft.com/office/powerpoint/2010/main" val="650770508"/>
+        <p14:creationId xmlns:p14="http://schemas.microsoft.com/office/powerpoint/2010/main" val="3464875610"/>
       </p:ext>
     </p:extLst>
   </p:cSld>
@@ -4337,12 +4365,42 @@
           <a:chExt cx="0" cy="0"/>
         </a:xfrm>
       </p:grpSpPr>
+      <p:sp>
+        <p:nvSpPr>
+          <p:cNvPr id="2" name="Title 1">
+            <a:extLst>
+              <a:ext uri="{FF2B5EF4-FFF2-40B4-BE49-F238E27FC236}">
+                <a16:creationId xmlns:a16="http://schemas.microsoft.com/office/drawing/2014/main" id="{3F54C2FE-FFD1-A347-BD51-B448349D76F9}"/>
+              </a:ext>
+            </a:extLst>
+          </p:cNvPr>
+          <p:cNvSpPr>
+            <a:spLocks noGrp="1"/>
+          </p:cNvSpPr>
+          <p:nvPr>
+            <p:ph type="title"/>
+          </p:nvPr>
+        </p:nvSpPr>
+        <p:spPr/>
+        <p:txBody>
+          <a:bodyPr>
+            <a:normAutofit fontScale="90000"/>
+          </a:bodyPr>
+          <a:lstStyle/>
+          <a:p>
+            <a:r>
+              <a:rPr lang="en-US" dirty="0"/>
+              <a:t>The width distribution as a function of AE is similar, but the distribution becomes more peaked at 0.1 s at higher AE.</a:t>
+            </a:r>
+          </a:p>
+        </p:txBody>
+      </p:sp>
       <p:pic>
         <p:nvPicPr>
           <p:cNvPr id="8" name="Content Placeholder 7">
             <a:extLst>
               <a:ext uri="{FF2B5EF4-FFF2-40B4-BE49-F238E27FC236}">
-                <a16:creationId xmlns:a16="http://schemas.microsoft.com/office/drawing/2014/main" id="{591E943F-9632-FA4E-B464-13F13A116076}"/>
+                <a16:creationId xmlns:a16="http://schemas.microsoft.com/office/drawing/2014/main" id="{AA3BC647-7328-9E4F-BB43-23F6F204F194}"/>
               </a:ext>
             </a:extLst>
           </p:cNvPr>
@@ -4361,8 +4419,8 @@
         </p:blipFill>
         <p:spPr>
           <a:xfrm>
-            <a:off x="5957152" y="365125"/>
-            <a:ext cx="5864303" cy="4351338"/>
+            <a:off x="874394" y="1900781"/>
+            <a:ext cx="10443211" cy="4351338"/>
           </a:xfrm>
         </p:spPr>
       </p:pic>
@@ -4371,7 +4429,7 @@
           <p:cNvPr id="4" name="Date Placeholder 3">
             <a:extLst>
               <a:ext uri="{FF2B5EF4-FFF2-40B4-BE49-F238E27FC236}">
-                <a16:creationId xmlns:a16="http://schemas.microsoft.com/office/drawing/2014/main" id="{770F4CC0-69BE-EB4B-B4BA-EEB456A52FC1}"/>
+                <a16:creationId xmlns:a16="http://schemas.microsoft.com/office/drawing/2014/main" id="{08AC12A8-EEF1-EB46-9F5B-080493156A63}"/>
               </a:ext>
             </a:extLst>
           </p:cNvPr>
@@ -4399,7 +4457,7 @@
           <p:cNvPr id="5" name="Footer Placeholder 4">
             <a:extLst>
               <a:ext uri="{FF2B5EF4-FFF2-40B4-BE49-F238E27FC236}">
-                <a16:creationId xmlns:a16="http://schemas.microsoft.com/office/drawing/2014/main" id="{15FE19F8-58AF-E644-ABC8-F2DFA3BDAD22}"/>
+                <a16:creationId xmlns:a16="http://schemas.microsoft.com/office/drawing/2014/main" id="{4C80945B-578E-E343-B238-F13B47F2C603}"/>
               </a:ext>
             </a:extLst>
           </p:cNvPr>
@@ -4427,7 +4485,7 @@
           <p:cNvPr id="6" name="Slide Number Placeholder 5">
             <a:extLst>
               <a:ext uri="{FF2B5EF4-FFF2-40B4-BE49-F238E27FC236}">
-                <a16:creationId xmlns:a16="http://schemas.microsoft.com/office/drawing/2014/main" id="{5BB4CB3F-FF92-004E-B3DA-C94A32C6D44B}"/>
+                <a16:creationId xmlns:a16="http://schemas.microsoft.com/office/drawing/2014/main" id="{98800850-61A2-0843-A6E5-365BB7348DAD}"/>
               </a:ext>
             </a:extLst>
           </p:cNvPr>
@@ -4451,126 +4509,10 @@
           </a:p>
         </p:txBody>
       </p:sp>
-      <p:sp>
-        <p:nvSpPr>
-          <p:cNvPr id="9" name="Rectangle 8">
-            <a:extLst>
-              <a:ext uri="{FF2B5EF4-FFF2-40B4-BE49-F238E27FC236}">
-                <a16:creationId xmlns:a16="http://schemas.microsoft.com/office/drawing/2014/main" id="{CB626665-C01B-3C40-9DF6-B4A476855C5D}"/>
-              </a:ext>
-            </a:extLst>
-          </p:cNvPr>
-          <p:cNvSpPr/>
-          <p:nvPr/>
-        </p:nvSpPr>
-        <p:spPr>
-          <a:xfrm>
-            <a:off x="7402882" y="1841326"/>
-            <a:ext cx="588723" cy="250521"/>
-          </a:xfrm>
-          <a:prstGeom prst="rect">
-            <a:avLst/>
-          </a:prstGeom>
-          <a:noFill/>
-          <a:ln w="38100">
-            <a:solidFill>
-              <a:srgbClr val="FF0000"/>
-            </a:solidFill>
-          </a:ln>
-        </p:spPr>
-        <p:style>
-          <a:lnRef idx="2">
-            <a:schemeClr val="accent1">
-              <a:shade val="50000"/>
-            </a:schemeClr>
-          </a:lnRef>
-          <a:fillRef idx="1">
-            <a:schemeClr val="accent1"/>
-          </a:fillRef>
-          <a:effectRef idx="0">
-            <a:schemeClr val="accent1"/>
-          </a:effectRef>
-          <a:fontRef idx="minor">
-            <a:schemeClr val="lt1"/>
-          </a:fontRef>
-        </p:style>
-        <p:txBody>
-          <a:bodyPr rtlCol="0" anchor="ctr"/>
-          <a:lstStyle/>
-          <a:p>
-            <a:pPr algn="ctr"/>
-            <a:endParaRPr lang="en-US"/>
-          </a:p>
-        </p:txBody>
-      </p:sp>
-      <p:sp>
-        <p:nvSpPr>
-          <p:cNvPr id="10" name="TextBox 9">
-            <a:extLst>
-              <a:ext uri="{FF2B5EF4-FFF2-40B4-BE49-F238E27FC236}">
-                <a16:creationId xmlns:a16="http://schemas.microsoft.com/office/drawing/2014/main" id="{A56B1B86-D737-7F49-A6E4-6AB807507AE5}"/>
-              </a:ext>
-            </a:extLst>
-          </p:cNvPr>
-          <p:cNvSpPr txBox="1"/>
-          <p:nvPr/>
-        </p:nvSpPr>
-        <p:spPr>
-          <a:xfrm>
-            <a:off x="588723" y="601249"/>
-            <a:ext cx="4083485" cy="2308324"/>
-          </a:xfrm>
-          <a:prstGeom prst="rect">
-            <a:avLst/>
-          </a:prstGeom>
-          <a:noFill/>
-        </p:spPr>
-        <p:txBody>
-          <a:bodyPr wrap="square" rtlCol="0">
-            <a:spAutoFit/>
-          </a:bodyPr>
-          <a:lstStyle/>
-          <a:p>
-            <a:r>
-              <a:rPr lang="en-US" dirty="0"/>
-              <a:t>Shue at al., 2019 used a random forest classifier and found that the chorus rising time is most strong anticorrelated with the electron temperature </a:t>
-            </a:r>
-            <a:r>
-              <a:rPr lang="en-US" dirty="0" err="1"/>
-              <a:t>Te</a:t>
-            </a:r>
-            <a:r>
-              <a:rPr lang="en-US" dirty="0"/>
-              <a:t>.</a:t>
-            </a:r>
-          </a:p>
-          <a:p>
-            <a:endParaRPr lang="en-US" dirty="0"/>
-          </a:p>
-          <a:p>
-            <a:r>
-              <a:rPr lang="en-US" dirty="0" err="1"/>
-              <a:t>Te</a:t>
-            </a:r>
-            <a:r>
-              <a:rPr lang="en-US" dirty="0"/>
-              <a:t> was calculated using the THEMIS </a:t>
-            </a:r>
-            <a:r>
-              <a:rPr lang="en-US" dirty="0" err="1"/>
-              <a:t>ElectroStatic</a:t>
-            </a:r>
-            <a:r>
-              <a:rPr lang="en-US" dirty="0"/>
-              <a:t> Analyzer (ESA). Few eV-30 keV energy.</a:t>
-            </a:r>
-          </a:p>
-        </p:txBody>
-      </p:sp>
     </p:spTree>
     <p:extLst>
       <p:ext uri="{BB962C8B-B14F-4D97-AF65-F5344CB8AC3E}">
-        <p14:creationId xmlns:p14="http://schemas.microsoft.com/office/powerpoint/2010/main" val="1374982281"/>
+        <p14:creationId xmlns:p14="http://schemas.microsoft.com/office/powerpoint/2010/main" val="3193542944"/>
       </p:ext>
     </p:extLst>
   </p:cSld>
@@ -4820,7 +4762,7 @@
           <a:lstStyle/>
           <a:p>
             <a:r>
-              <a:rPr lang="en-US"/>
+              <a:rPr lang="en-US" dirty="0"/>
               <a:t>11/3/20</a:t>
             </a:r>
           </a:p>
@@ -4898,7 +4840,7 @@
         <p:spPr>
           <a:xfrm>
             <a:off x="413359" y="851770"/>
-            <a:ext cx="3832964" cy="5262979"/>
+            <a:ext cx="3832964" cy="3539430"/>
           </a:xfrm>
           <a:prstGeom prst="rect">
             <a:avLst/>
@@ -4912,21 +4854,12 @@
           <a:lstStyle/>
           <a:p>
             <a:r>
+              <a:rPr lang="en-US" sz="2800" b="1" dirty="0"/>
+              <a:t>Question to consider: </a:t>
+            </a:r>
+            <a:r>
               <a:rPr lang="en-US" sz="2800" dirty="0"/>
-              <a:t>Further investigation is necessary, but this is a good start.</a:t>
-            </a:r>
-          </a:p>
-          <a:p>
-            <a:endParaRPr lang="en-US" sz="2800" dirty="0"/>
-          </a:p>
-          <a:p>
-            <a:r>
-              <a:rPr lang="en-US" sz="2800" b="1" dirty="0"/>
-              <a:t>Question to ponder: </a:t>
-            </a:r>
-            <a:r>
-              <a:rPr lang="en-US" sz="2800" dirty="0"/>
-              <a:t>The chorus-microburst durations follow a similar trend, but why are chorus wave durations longer?</a:t>
+              <a:t>The chorus-microburst durations follow a similar trend, but why are chorus wave durations typically longer?</a:t>
             </a:r>
           </a:p>
           <a:p>
@@ -7924,7 +7857,7 @@
           <p:cNvPr id="2" name="Title 1">
             <a:extLst>
               <a:ext uri="{FF2B5EF4-FFF2-40B4-BE49-F238E27FC236}">
-                <a16:creationId xmlns:a16="http://schemas.microsoft.com/office/drawing/2014/main" id="{3F54C2FE-FFD1-A347-BD51-B448349D76F9}"/>
+                <a16:creationId xmlns:a16="http://schemas.microsoft.com/office/drawing/2014/main" id="{AB1BCD56-CC35-9442-B540-F69CA1412E96}"/>
               </a:ext>
             </a:extLst>
           </p:cNvPr>
@@ -7937,14 +7870,12 @@
         </p:nvSpPr>
         <p:spPr/>
         <p:txBody>
-          <a:bodyPr>
-            <a:normAutofit fontScale="90000"/>
-          </a:bodyPr>
+          <a:bodyPr/>
           <a:lstStyle/>
           <a:p>
             <a:r>
               <a:rPr lang="en-US" dirty="0"/>
-              <a:t>The width distribution as a function of AE is similar, but the distribution becomes more peaked at 0.1 s at higher AE.</a:t>
+              <a:t>The chorus rising tone element duration follows a similar pattern.</a:t>
             </a:r>
           </a:p>
         </p:txBody>
@@ -7954,7 +7885,7 @@
           <p:cNvPr id="8" name="Content Placeholder 7">
             <a:extLst>
               <a:ext uri="{FF2B5EF4-FFF2-40B4-BE49-F238E27FC236}">
-                <a16:creationId xmlns:a16="http://schemas.microsoft.com/office/drawing/2014/main" id="{AA3BC647-7328-9E4F-BB43-23F6F204F194}"/>
+                <a16:creationId xmlns:a16="http://schemas.microsoft.com/office/drawing/2014/main" id="{B2C8391E-2896-7747-81BA-B69D606F3F39}"/>
               </a:ext>
             </a:extLst>
           </p:cNvPr>
@@ -7973,8 +7904,8 @@
         </p:blipFill>
         <p:spPr>
           <a:xfrm>
-            <a:off x="874394" y="1900781"/>
-            <a:ext cx="10443211" cy="4351338"/>
+            <a:off x="1346139" y="1690688"/>
+            <a:ext cx="6432524" cy="4750677"/>
           </a:xfrm>
         </p:spPr>
       </p:pic>
@@ -7983,7 +7914,7 @@
           <p:cNvPr id="4" name="Date Placeholder 3">
             <a:extLst>
               <a:ext uri="{FF2B5EF4-FFF2-40B4-BE49-F238E27FC236}">
-                <a16:creationId xmlns:a16="http://schemas.microsoft.com/office/drawing/2014/main" id="{08AC12A8-EEF1-EB46-9F5B-080493156A63}"/>
+                <a16:creationId xmlns:a16="http://schemas.microsoft.com/office/drawing/2014/main" id="{A4E2E9A9-318D-FC4B-BFE2-B00C285EC279}"/>
               </a:ext>
             </a:extLst>
           </p:cNvPr>
@@ -8011,7 +7942,7 @@
           <p:cNvPr id="5" name="Footer Placeholder 4">
             <a:extLst>
               <a:ext uri="{FF2B5EF4-FFF2-40B4-BE49-F238E27FC236}">
-                <a16:creationId xmlns:a16="http://schemas.microsoft.com/office/drawing/2014/main" id="{4C80945B-578E-E343-B238-F13B47F2C603}"/>
+                <a16:creationId xmlns:a16="http://schemas.microsoft.com/office/drawing/2014/main" id="{BB9F98E9-CF8E-9D4A-AAB9-0BD5DA39B179}"/>
               </a:ext>
             </a:extLst>
           </p:cNvPr>
@@ -8039,7 +7970,7 @@
           <p:cNvPr id="6" name="Slide Number Placeholder 5">
             <a:extLst>
               <a:ext uri="{FF2B5EF4-FFF2-40B4-BE49-F238E27FC236}">
-                <a16:creationId xmlns:a16="http://schemas.microsoft.com/office/drawing/2014/main" id="{98800850-61A2-0843-A6E5-365BB7348DAD}"/>
+                <a16:creationId xmlns:a16="http://schemas.microsoft.com/office/drawing/2014/main" id="{61D5EDB4-D48B-4B44-B4A7-7981DA5D571E}"/>
               </a:ext>
             </a:extLst>
           </p:cNvPr>
@@ -8059,6 +7990,192 @@
               <a:rPr lang="en-US" smtClean="0"/>
               <a:t>9</a:t>
             </a:fld>
+            <a:endParaRPr lang="en-US" dirty="0"/>
+          </a:p>
+        </p:txBody>
+      </p:sp>
+      <p:pic>
+        <p:nvPicPr>
+          <p:cNvPr id="10" name="Picture 9">
+            <a:extLst>
+              <a:ext uri="{FF2B5EF4-FFF2-40B4-BE49-F238E27FC236}">
+                <a16:creationId xmlns:a16="http://schemas.microsoft.com/office/drawing/2014/main" id="{54A76B22-88EB-E742-A88D-3DB1EB241327}"/>
+              </a:ext>
+            </a:extLst>
+          </p:cNvPr>
+          <p:cNvPicPr>
+            <a:picLocks noChangeAspect="1"/>
+          </p:cNvPicPr>
+          <p:nvPr/>
+        </p:nvPicPr>
+        <p:blipFill rotWithShape="1">
+          <a:blip r:embed="rId3"/>
+          <a:srcRect r="50662"/>
+          <a:stretch/>
+        </p:blipFill>
+        <p:spPr>
+          <a:xfrm>
+            <a:off x="8510205" y="1577671"/>
+            <a:ext cx="2943989" cy="4778679"/>
+          </a:xfrm>
+          <a:prstGeom prst="rect">
+            <a:avLst/>
+          </a:prstGeom>
+        </p:spPr>
+      </p:pic>
+      <p:sp>
+        <p:nvSpPr>
+          <p:cNvPr id="11" name="TextBox 10">
+            <a:extLst>
+              <a:ext uri="{FF2B5EF4-FFF2-40B4-BE49-F238E27FC236}">
+                <a16:creationId xmlns:a16="http://schemas.microsoft.com/office/drawing/2014/main" id="{05BA62EC-C86B-C34F-964D-7EA87C6C5E8F}"/>
+              </a:ext>
+            </a:extLst>
+          </p:cNvPr>
+          <p:cNvSpPr txBox="1"/>
+          <p:nvPr/>
+        </p:nvSpPr>
+        <p:spPr>
+          <a:xfrm>
+            <a:off x="9682619" y="2329841"/>
+            <a:ext cx="1553228" cy="369332"/>
+          </a:xfrm>
+          <a:prstGeom prst="rect">
+            <a:avLst/>
+          </a:prstGeom>
+          <a:noFill/>
+        </p:spPr>
+        <p:txBody>
+          <a:bodyPr wrap="square" rtlCol="0">
+            <a:spAutoFit/>
+          </a:bodyPr>
+          <a:lstStyle/>
+          <a:p>
+            <a:r>
+              <a:rPr lang="en-US" dirty="0"/>
+              <a:t>Median: 0.3 s</a:t>
+            </a:r>
+          </a:p>
+        </p:txBody>
+      </p:sp>
+      <p:sp>
+        <p:nvSpPr>
+          <p:cNvPr id="12" name="TextBox 11">
+            <a:extLst>
+              <a:ext uri="{FF2B5EF4-FFF2-40B4-BE49-F238E27FC236}">
+                <a16:creationId xmlns:a16="http://schemas.microsoft.com/office/drawing/2014/main" id="{7E4A846E-A817-2F4C-97CB-521E5110ACAF}"/>
+              </a:ext>
+            </a:extLst>
+          </p:cNvPr>
+          <p:cNvSpPr txBox="1"/>
+          <p:nvPr/>
+        </p:nvSpPr>
+        <p:spPr>
+          <a:xfrm>
+            <a:off x="9659411" y="4389975"/>
+            <a:ext cx="1553228" cy="369332"/>
+          </a:xfrm>
+          <a:prstGeom prst="rect">
+            <a:avLst/>
+          </a:prstGeom>
+          <a:noFill/>
+        </p:spPr>
+        <p:txBody>
+          <a:bodyPr wrap="square" rtlCol="0">
+            <a:spAutoFit/>
+          </a:bodyPr>
+          <a:lstStyle/>
+          <a:p>
+            <a:r>
+              <a:rPr lang="en-US" dirty="0"/>
+              <a:t>Median: 0.6 s</a:t>
+            </a:r>
+          </a:p>
+        </p:txBody>
+      </p:sp>
+      <p:sp>
+        <p:nvSpPr>
+          <p:cNvPr id="13" name="TextBox 12">
+            <a:extLst>
+              <a:ext uri="{FF2B5EF4-FFF2-40B4-BE49-F238E27FC236}">
+                <a16:creationId xmlns:a16="http://schemas.microsoft.com/office/drawing/2014/main" id="{8575B698-78FB-B246-A55B-7E5971C3F7FC}"/>
+              </a:ext>
+            </a:extLst>
+          </p:cNvPr>
+          <p:cNvSpPr txBox="1"/>
+          <p:nvPr/>
+        </p:nvSpPr>
+        <p:spPr>
+          <a:xfrm>
+            <a:off x="6379493" y="5891574"/>
+            <a:ext cx="1755975" cy="369332"/>
+          </a:xfrm>
+          <a:prstGeom prst="rect">
+            <a:avLst/>
+          </a:prstGeom>
+          <a:noFill/>
+        </p:spPr>
+        <p:txBody>
+          <a:bodyPr wrap="square" rtlCol="0">
+            <a:spAutoFit/>
+          </a:bodyPr>
+          <a:lstStyle/>
+          <a:p>
+            <a:r>
+              <a:rPr lang="en-US" dirty="0"/>
+              <a:t>Shue et al., 2019</a:t>
+            </a:r>
+          </a:p>
+        </p:txBody>
+      </p:sp>
+      <p:sp>
+        <p:nvSpPr>
+          <p:cNvPr id="14" name="Rectangle 13">
+            <a:extLst>
+              <a:ext uri="{FF2B5EF4-FFF2-40B4-BE49-F238E27FC236}">
+                <a16:creationId xmlns:a16="http://schemas.microsoft.com/office/drawing/2014/main" id="{6E660982-C307-2040-8FCF-A7FC3B45FCA0}"/>
+              </a:ext>
+            </a:extLst>
+          </p:cNvPr>
+          <p:cNvSpPr/>
+          <p:nvPr/>
+        </p:nvSpPr>
+        <p:spPr>
+          <a:xfrm>
+            <a:off x="8304756" y="1577671"/>
+            <a:ext cx="3331923" cy="4778679"/>
+          </a:xfrm>
+          <a:prstGeom prst="rect">
+            <a:avLst/>
+          </a:prstGeom>
+          <a:noFill/>
+          <a:ln w="38100">
+            <a:solidFill>
+              <a:srgbClr val="FF0000"/>
+            </a:solidFill>
+          </a:ln>
+        </p:spPr>
+        <p:style>
+          <a:lnRef idx="2">
+            <a:schemeClr val="accent1">
+              <a:shade val="50000"/>
+            </a:schemeClr>
+          </a:lnRef>
+          <a:fillRef idx="1">
+            <a:schemeClr val="accent1"/>
+          </a:fillRef>
+          <a:effectRef idx="0">
+            <a:schemeClr val="accent1"/>
+          </a:effectRef>
+          <a:fontRef idx="minor">
+            <a:schemeClr val="lt1"/>
+          </a:fontRef>
+        </p:style>
+        <p:txBody>
+          <a:bodyPr rtlCol="0" anchor="ctr"/>
+          <a:lstStyle/>
+          <a:p>
+            <a:pPr algn="ctr"/>
             <a:endParaRPr lang="en-US"/>
           </a:p>
         </p:txBody>
@@ -8066,7 +8183,7 @@
     </p:spTree>
     <p:extLst>
       <p:ext uri="{BB962C8B-B14F-4D97-AF65-F5344CB8AC3E}">
-        <p14:creationId xmlns:p14="http://schemas.microsoft.com/office/powerpoint/2010/main" val="3193542944"/>
+        <p14:creationId xmlns:p14="http://schemas.microsoft.com/office/powerpoint/2010/main" val="650770508"/>
       </p:ext>
     </p:extLst>
   </p:cSld>

</xml_diff>